<commit_message>
new starbuck web and add js PPT
</commit_message>
<xml_diff>
--- a/HTML & CSS & Javascript - RWD.pptx
+++ b/HTML & CSS & Javascript - RWD.pptx
@@ -232,7 +232,7 @@
           <a:p>
             <a:fld id="{F8F9F50E-CBF4-4BC9-B9FE-221518E4EE47}" type="datetimeFigureOut">
               <a:rPr lang="zh-TW" altLang="en-US" smtClean="0"/>
-              <a:t>2021/5/15</a:t>
+              <a:t>2021/5/24</a:t>
             </a:fld>
             <a:endParaRPr lang="zh-TW" altLang="en-US"/>
           </a:p>
@@ -669,7 +669,7 @@
             <a:fld id="{87DE6118-2437-4B30-8E3C-4D2BE6020583}" type="datetimeFigureOut">
               <a:rPr lang="en-US" dirty="0"/>
               <a:pPr/>
-              <a:t>5/15/2021</a:t>
+              <a:t>5/24/2021</a:t>
             </a:fld>
             <a:endParaRPr lang="en-US" dirty="0"/>
           </a:p>
@@ -1145,7 +1145,7 @@
             <a:fld id="{87DE6118-2437-4B30-8E3C-4D2BE6020583}" type="datetimeFigureOut">
               <a:rPr lang="en-US" dirty="0"/>
               <a:pPr/>
-              <a:t>5/15/2021</a:t>
+              <a:t>5/24/2021</a:t>
             </a:fld>
             <a:endParaRPr lang="en-US" dirty="0"/>
           </a:p>
@@ -1380,7 +1380,7 @@
           <a:p>
             <a:fld id="{87DE6118-2437-4B30-8E3C-4D2BE6020583}" type="datetimeFigureOut">
               <a:rPr lang="en-US" dirty="0"/>
-              <a:t>5/15/2021</a:t>
+              <a:t>5/24/2021</a:t>
             </a:fld>
             <a:endParaRPr lang="en-US" dirty="0"/>
           </a:p>
@@ -1555,7 +1555,7 @@
           <a:p>
             <a:fld id="{87DE6118-2437-4B30-8E3C-4D2BE6020583}" type="datetimeFigureOut">
               <a:rPr lang="en-US" dirty="0"/>
-              <a:t>5/15/2021</a:t>
+              <a:t>5/24/2021</a:t>
             </a:fld>
             <a:endParaRPr lang="en-US" dirty="0"/>
           </a:p>
@@ -1769,7 +1769,7 @@
             <a:fld id="{87DE6118-2437-4B30-8E3C-4D2BE6020583}" type="datetimeFigureOut">
               <a:rPr lang="en-US" smtClean="0"/>
               <a:pPr/>
-              <a:t>5/15/2021</a:t>
+              <a:t>5/24/2021</a:t>
             </a:fld>
             <a:endParaRPr lang="en-US" dirty="0"/>
           </a:p>
@@ -2045,7 +2045,7 @@
             <a:fld id="{87DE6118-2437-4B30-8E3C-4D2BE6020583}" type="datetimeFigureOut">
               <a:rPr lang="en-US" smtClean="0"/>
               <a:pPr/>
-              <a:t>5/15/2021</a:t>
+              <a:t>5/24/2021</a:t>
             </a:fld>
             <a:endParaRPr lang="en-US" dirty="0"/>
           </a:p>
@@ -2336,7 +2336,7 @@
             <a:fld id="{87DE6118-2437-4B30-8E3C-4D2BE6020583}" type="datetimeFigureOut">
               <a:rPr lang="en-US" dirty="0"/>
               <a:pPr/>
-              <a:t>5/15/2021</a:t>
+              <a:t>5/24/2021</a:t>
             </a:fld>
             <a:endParaRPr lang="en-US" dirty="0"/>
           </a:p>
@@ -2726,7 +2726,7 @@
           <a:p>
             <a:fld id="{87DE6118-2437-4B30-8E3C-4D2BE6020583}" type="datetimeFigureOut">
               <a:rPr lang="en-US" dirty="0"/>
-              <a:t>5/15/2021</a:t>
+              <a:t>5/24/2021</a:t>
             </a:fld>
             <a:endParaRPr lang="en-US" dirty="0"/>
           </a:p>
@@ -3198,7 +3198,7 @@
           <a:p>
             <a:fld id="{87DE6118-2437-4B30-8E3C-4D2BE6020583}" type="datetimeFigureOut">
               <a:rPr lang="en-US" dirty="0"/>
-              <a:t>5/15/2021</a:t>
+              <a:t>5/24/2021</a:t>
             </a:fld>
             <a:endParaRPr lang="en-US" dirty="0"/>
           </a:p>
@@ -3311,7 +3311,7 @@
           <a:p>
             <a:fld id="{87DE6118-2437-4B30-8E3C-4D2BE6020583}" type="datetimeFigureOut">
               <a:rPr lang="en-US" dirty="0"/>
-              <a:t>5/15/2021</a:t>
+              <a:t>5/24/2021</a:t>
             </a:fld>
             <a:endParaRPr lang="en-US" dirty="0"/>
           </a:p>
@@ -3401,7 +3401,7 @@
           <a:p>
             <a:fld id="{87DE6118-2437-4B30-8E3C-4D2BE6020583}" type="datetimeFigureOut">
               <a:rPr lang="en-US" dirty="0"/>
-              <a:t>5/15/2021</a:t>
+              <a:t>5/24/2021</a:t>
             </a:fld>
             <a:endParaRPr lang="en-US" dirty="0"/>
           </a:p>
@@ -3743,7 +3743,7 @@
             <a:fld id="{87DE6118-2437-4B30-8E3C-4D2BE6020583}" type="datetimeFigureOut">
               <a:rPr lang="en-US" dirty="0"/>
               <a:pPr/>
-              <a:t>5/15/2021</a:t>
+              <a:t>5/24/2021</a:t>
             </a:fld>
             <a:endParaRPr lang="en-US" dirty="0"/>
           </a:p>
@@ -4018,7 +4018,7 @@
             <a:fld id="{87DE6118-2437-4B30-8E3C-4D2BE6020583}" type="datetimeFigureOut">
               <a:rPr lang="en-US" dirty="0"/>
               <a:pPr/>
-              <a:t>5/15/2021</a:t>
+              <a:t>5/24/2021</a:t>
             </a:fld>
             <a:endParaRPr lang="en-US" dirty="0"/>
           </a:p>

</xml_diff>